<commit_message>
After G&D meeting 4/15
</commit_message>
<xml_diff>
--- a/Limits to the God Machine.pptx
+++ b/Limits to the God Machine.pptx
@@ -198,7 +198,7 @@
           <a:p>
             <a:fld id="{0E9AADEE-B9AC-4E7F-BCF2-5C374527BD03}" type="datetimeFigureOut">
               <a:rPr lang="en-US" smtClean="0"/>
-              <a:t>4/14/2013</a:t>
+              <a:t>4/15/2013</a:t>
             </a:fld>
             <a:endParaRPr lang="en-US"/>
           </a:p>
@@ -739,7 +739,7 @@
           <a:p>
             <a:fld id="{19E4320D-EE99-4BF7-B374-A5A49F4295A1}" type="datetimeFigureOut">
               <a:rPr lang="en-US" smtClean="0"/>
-              <a:t>4/14/2013</a:t>
+              <a:t>4/15/2013</a:t>
             </a:fld>
             <a:endParaRPr lang="en-US"/>
           </a:p>
@@ -909,7 +909,7 @@
           <a:p>
             <a:fld id="{19E4320D-EE99-4BF7-B374-A5A49F4295A1}" type="datetimeFigureOut">
               <a:rPr lang="en-US" smtClean="0"/>
-              <a:t>4/14/2013</a:t>
+              <a:t>4/15/2013</a:t>
             </a:fld>
             <a:endParaRPr lang="en-US"/>
           </a:p>
@@ -1089,7 +1089,7 @@
           <a:p>
             <a:fld id="{19E4320D-EE99-4BF7-B374-A5A49F4295A1}" type="datetimeFigureOut">
               <a:rPr lang="en-US" smtClean="0"/>
-              <a:t>4/14/2013</a:t>
+              <a:t>4/15/2013</a:t>
             </a:fld>
             <a:endParaRPr lang="en-US"/>
           </a:p>
@@ -1259,7 +1259,7 @@
           <a:p>
             <a:fld id="{19E4320D-EE99-4BF7-B374-A5A49F4295A1}" type="datetimeFigureOut">
               <a:rPr lang="en-US" smtClean="0"/>
-              <a:t>4/14/2013</a:t>
+              <a:t>4/15/2013</a:t>
             </a:fld>
             <a:endParaRPr lang="en-US"/>
           </a:p>
@@ -1505,7 +1505,7 @@
           <a:p>
             <a:fld id="{19E4320D-EE99-4BF7-B374-A5A49F4295A1}" type="datetimeFigureOut">
               <a:rPr lang="en-US" smtClean="0"/>
-              <a:t>4/14/2013</a:t>
+              <a:t>4/15/2013</a:t>
             </a:fld>
             <a:endParaRPr lang="en-US"/>
           </a:p>
@@ -1793,7 +1793,7 @@
           <a:p>
             <a:fld id="{19E4320D-EE99-4BF7-B374-A5A49F4295A1}" type="datetimeFigureOut">
               <a:rPr lang="en-US" smtClean="0"/>
-              <a:t>4/14/2013</a:t>
+              <a:t>4/15/2013</a:t>
             </a:fld>
             <a:endParaRPr lang="en-US"/>
           </a:p>
@@ -2215,7 +2215,7 @@
           <a:p>
             <a:fld id="{19E4320D-EE99-4BF7-B374-A5A49F4295A1}" type="datetimeFigureOut">
               <a:rPr lang="en-US" smtClean="0"/>
-              <a:t>4/14/2013</a:t>
+              <a:t>4/15/2013</a:t>
             </a:fld>
             <a:endParaRPr lang="en-US"/>
           </a:p>
@@ -2333,7 +2333,7 @@
           <a:p>
             <a:fld id="{19E4320D-EE99-4BF7-B374-A5A49F4295A1}" type="datetimeFigureOut">
               <a:rPr lang="en-US" smtClean="0"/>
-              <a:t>4/14/2013</a:t>
+              <a:t>4/15/2013</a:t>
             </a:fld>
             <a:endParaRPr lang="en-US"/>
           </a:p>
@@ -2428,7 +2428,7 @@
           <a:p>
             <a:fld id="{19E4320D-EE99-4BF7-B374-A5A49F4295A1}" type="datetimeFigureOut">
               <a:rPr lang="en-US" smtClean="0"/>
-              <a:t>4/14/2013</a:t>
+              <a:t>4/15/2013</a:t>
             </a:fld>
             <a:endParaRPr lang="en-US"/>
           </a:p>
@@ -2705,7 +2705,7 @@
           <a:p>
             <a:fld id="{19E4320D-EE99-4BF7-B374-A5A49F4295A1}" type="datetimeFigureOut">
               <a:rPr lang="en-US" smtClean="0"/>
-              <a:t>4/14/2013</a:t>
+              <a:t>4/15/2013</a:t>
             </a:fld>
             <a:endParaRPr lang="en-US"/>
           </a:p>
@@ -2958,7 +2958,7 @@
           <a:p>
             <a:fld id="{19E4320D-EE99-4BF7-B374-A5A49F4295A1}" type="datetimeFigureOut">
               <a:rPr lang="en-US" smtClean="0"/>
-              <a:t>4/14/2013</a:t>
+              <a:t>4/15/2013</a:t>
             </a:fld>
             <a:endParaRPr lang="en-US"/>
           </a:p>
@@ -3171,7 +3171,7 @@
           <a:p>
             <a:fld id="{19E4320D-EE99-4BF7-B374-A5A49F4295A1}" type="datetimeFigureOut">
               <a:rPr lang="en-US" smtClean="0"/>
-              <a:t>4/14/2013</a:t>
+              <a:t>4/15/2013</a:t>
             </a:fld>
             <a:endParaRPr lang="en-US"/>
           </a:p>
@@ -3563,11 +3563,7 @@
           <a:p>
             <a:r>
               <a:rPr lang="en-US" dirty="0" smtClean="0"/>
-              <a:t>Limits to the God </a:t>
-            </a:r>
-            <a:r>
-              <a:rPr lang="en-US" dirty="0" smtClean="0"/>
-              <a:t>Machine</a:t>
+              <a:t>Limits to the God Machine</a:t>
             </a:r>
             <a:br>
               <a:rPr lang="en-US" dirty="0" smtClean="0"/>
@@ -3894,11 +3890,7 @@
             <a:pPr lvl="1"/>
             <a:r>
               <a:rPr lang="en-US" sz="2300" b="1" dirty="0" smtClean="0"/>
-              <a:t>Consistency </a:t>
-            </a:r>
-            <a:r>
-              <a:rPr lang="en-US" sz="2300" b="1" dirty="0" smtClean="0"/>
-              <a:t>or completeness</a:t>
+              <a:t>Consistency or completeness</a:t>
             </a:r>
             <a:r>
               <a:rPr lang="en-US" sz="2300" dirty="0" smtClean="0"/>

</xml_diff>